<commit_message>
data science future update
</commit_message>
<xml_diff>
--- a/Future_Applications/Your Data Science Future.pptx
+++ b/Future_Applications/Your Data Science Future.pptx
@@ -5,7 +5,7 @@
     <p:sldMasterId id="2147483659" r:id="rId1"/>
   </p:sldMasterIdLst>
   <p:notesMasterIdLst>
-    <p:notesMasterId r:id="rId27"/>
+    <p:notesMasterId r:id="rId24"/>
   </p:notesMasterIdLst>
   <p:sldIdLst>
     <p:sldId id="256" r:id="rId2"/>
@@ -28,26 +28,23 @@
     <p:sldId id="273" r:id="rId19"/>
     <p:sldId id="274" r:id="rId20"/>
     <p:sldId id="275" r:id="rId21"/>
-    <p:sldId id="276" r:id="rId22"/>
-    <p:sldId id="277" r:id="rId23"/>
-    <p:sldId id="278" r:id="rId24"/>
-    <p:sldId id="280" r:id="rId25"/>
-    <p:sldId id="279" r:id="rId26"/>
+    <p:sldId id="280" r:id="rId22"/>
+    <p:sldId id="279" r:id="rId23"/>
   </p:sldIdLst>
   <p:sldSz cx="9144000" cy="5143500" type="screen16x9"/>
   <p:notesSz cx="6858000" cy="9144000"/>
   <p:embeddedFontLst>
     <p:embeddedFont>
-      <p:font typeface="Maven Pro" panose="020B0604020202020204" charset="0"/>
-      <p:regular r:id="rId28"/>
-      <p:bold r:id="rId29"/>
+      <p:font typeface="Maven Pro" pitchFamily="2" charset="77"/>
+      <p:regular r:id="rId25"/>
+      <p:bold r:id="rId26"/>
     </p:embeddedFont>
     <p:embeddedFont>
-      <p:font typeface="Nunito" pitchFamily="2" charset="0"/>
-      <p:regular r:id="rId30"/>
-      <p:bold r:id="rId31"/>
-      <p:italic r:id="rId32"/>
-      <p:boldItalic r:id="rId33"/>
+      <p:font typeface="Nunito" pitchFamily="2" charset="77"/>
+      <p:regular r:id="rId27"/>
+      <p:bold r:id="rId28"/>
+      <p:italic r:id="rId29"/>
+      <p:boldItalic r:id="rId30"/>
     </p:embeddedFont>
   </p:embeddedFontLst>
   <p:defaultTextStyle>
@@ -2188,318 +2185,6 @@
         </p:txBody>
       </p:sp>
     </p:spTree>
-  </p:cSld>
-  <p:clrMapOvr>
-    <a:masterClrMapping/>
-  </p:clrMapOvr>
-</p:notes>
-</file>
-
-<file path=ppt/notesSlides/notesSlide22.xml><?xml version="1.0" encoding="utf-8"?>
-<p:notes xmlns:a="http://schemas.openxmlformats.org/drawingml/2006/main" xmlns:r="http://schemas.openxmlformats.org/officeDocument/2006/relationships" xmlns:p="http://schemas.openxmlformats.org/presentationml/2006/main" showMasterSp="0" showMasterPhAnim="0">
-  <p:cSld>
-    <p:spTree>
-      <p:nvGrpSpPr>
-        <p:cNvPr id="1" name="Shape 422"/>
-        <p:cNvGrpSpPr/>
-        <p:nvPr/>
-      </p:nvGrpSpPr>
-      <p:grpSpPr>
-        <a:xfrm>
-          <a:off x="0" y="0"/>
-          <a:ext cx="0" cy="0"/>
-          <a:chOff x="0" y="0"/>
-          <a:chExt cx="0" cy="0"/>
-        </a:xfrm>
-      </p:grpSpPr>
-      <p:sp>
-        <p:nvSpPr>
-          <p:cNvPr id="423" name="Google Shape;423;g10043abaf29_0_291:notes"/>
-          <p:cNvSpPr>
-            <a:spLocks noGrp="1" noRot="1" noChangeAspect="1"/>
-          </p:cNvSpPr>
-          <p:nvPr>
-            <p:ph type="sldImg" idx="2"/>
-          </p:nvPr>
-        </p:nvSpPr>
-        <p:spPr>
-          <a:xfrm>
-            <a:off x="381300" y="685800"/>
-            <a:ext cx="6096000" cy="3429000"/>
-          </a:xfrm>
-          <a:custGeom>
-            <a:avLst/>
-            <a:gdLst/>
-            <a:ahLst/>
-            <a:cxnLst/>
-            <a:rect l="l" t="t" r="r" b="b"/>
-            <a:pathLst>
-              <a:path w="120000" h="120000" extrusionOk="0">
-                <a:moveTo>
-                  <a:pt x="0" y="0"/>
-                </a:moveTo>
-                <a:lnTo>
-                  <a:pt x="120000" y="0"/>
-                </a:lnTo>
-                <a:lnTo>
-                  <a:pt x="120000" y="120000"/>
-                </a:lnTo>
-                <a:lnTo>
-                  <a:pt x="0" y="120000"/>
-                </a:lnTo>
-                <a:close/>
-              </a:path>
-            </a:pathLst>
-          </a:custGeom>
-        </p:spPr>
-      </p:sp>
-      <p:sp>
-        <p:nvSpPr>
-          <p:cNvPr id="424" name="Google Shape;424;g10043abaf29_0_291:notes"/>
-          <p:cNvSpPr txBox="1">
-            <a:spLocks noGrp="1"/>
-          </p:cNvSpPr>
-          <p:nvPr>
-            <p:ph type="body" idx="1"/>
-          </p:nvPr>
-        </p:nvSpPr>
-        <p:spPr>
-          <a:xfrm>
-            <a:off x="685800" y="4343400"/>
-            <a:ext cx="5486400" cy="4114800"/>
-          </a:xfrm>
-          <a:prstGeom prst="rect">
-            <a:avLst/>
-          </a:prstGeom>
-        </p:spPr>
-        <p:txBody>
-          <a:bodyPr spcFirstLastPara="1" wrap="square" lIns="91425" tIns="91425" rIns="91425" bIns="91425" anchor="t" anchorCtr="0">
-            <a:noAutofit/>
-          </a:bodyPr>
-          <a:lstStyle/>
-          <a:p>
-            <a:pPr marL="0" lvl="0" indent="0" algn="l" rtl="0">
-              <a:spcBef>
-                <a:spcPts val="0"/>
-              </a:spcBef>
-              <a:spcAft>
-                <a:spcPts val="0"/>
-              </a:spcAft>
-              <a:buNone/>
-            </a:pPr>
-            <a:endParaRPr/>
-          </a:p>
-        </p:txBody>
-      </p:sp>
-    </p:spTree>
-  </p:cSld>
-  <p:clrMapOvr>
-    <a:masterClrMapping/>
-  </p:clrMapOvr>
-</p:notes>
-</file>
-
-<file path=ppt/notesSlides/notesSlide23.xml><?xml version="1.0" encoding="utf-8"?>
-<p:notes xmlns:a="http://schemas.openxmlformats.org/drawingml/2006/main" xmlns:r="http://schemas.openxmlformats.org/officeDocument/2006/relationships" xmlns:p="http://schemas.openxmlformats.org/presentationml/2006/main" showMasterSp="0" showMasterPhAnim="0">
-  <p:cSld>
-    <p:spTree>
-      <p:nvGrpSpPr>
-        <p:cNvPr id="1" name="Shape 428"/>
-        <p:cNvGrpSpPr/>
-        <p:nvPr/>
-      </p:nvGrpSpPr>
-      <p:grpSpPr>
-        <a:xfrm>
-          <a:off x="0" y="0"/>
-          <a:ext cx="0" cy="0"/>
-          <a:chOff x="0" y="0"/>
-          <a:chExt cx="0" cy="0"/>
-        </a:xfrm>
-      </p:grpSpPr>
-      <p:sp>
-        <p:nvSpPr>
-          <p:cNvPr id="429" name="Google Shape;429;g10043abaf29_0_304:notes"/>
-          <p:cNvSpPr>
-            <a:spLocks noGrp="1" noRot="1" noChangeAspect="1"/>
-          </p:cNvSpPr>
-          <p:nvPr>
-            <p:ph type="sldImg" idx="2"/>
-          </p:nvPr>
-        </p:nvSpPr>
-        <p:spPr>
-          <a:xfrm>
-            <a:off x="381300" y="685800"/>
-            <a:ext cx="6096000" cy="3429000"/>
-          </a:xfrm>
-          <a:custGeom>
-            <a:avLst/>
-            <a:gdLst/>
-            <a:ahLst/>
-            <a:cxnLst/>
-            <a:rect l="l" t="t" r="r" b="b"/>
-            <a:pathLst>
-              <a:path w="120000" h="120000" extrusionOk="0">
-                <a:moveTo>
-                  <a:pt x="0" y="0"/>
-                </a:moveTo>
-                <a:lnTo>
-                  <a:pt x="120000" y="0"/>
-                </a:lnTo>
-                <a:lnTo>
-                  <a:pt x="120000" y="120000"/>
-                </a:lnTo>
-                <a:lnTo>
-                  <a:pt x="0" y="120000"/>
-                </a:lnTo>
-                <a:close/>
-              </a:path>
-            </a:pathLst>
-          </a:custGeom>
-        </p:spPr>
-      </p:sp>
-      <p:sp>
-        <p:nvSpPr>
-          <p:cNvPr id="430" name="Google Shape;430;g10043abaf29_0_304:notes"/>
-          <p:cNvSpPr txBox="1">
-            <a:spLocks noGrp="1"/>
-          </p:cNvSpPr>
-          <p:nvPr>
-            <p:ph type="body" idx="1"/>
-          </p:nvPr>
-        </p:nvSpPr>
-        <p:spPr>
-          <a:xfrm>
-            <a:off x="685800" y="4343400"/>
-            <a:ext cx="5486400" cy="4114800"/>
-          </a:xfrm>
-          <a:prstGeom prst="rect">
-            <a:avLst/>
-          </a:prstGeom>
-        </p:spPr>
-        <p:txBody>
-          <a:bodyPr spcFirstLastPara="1" wrap="square" lIns="91425" tIns="91425" rIns="91425" bIns="91425" anchor="t" anchorCtr="0">
-            <a:noAutofit/>
-          </a:bodyPr>
-          <a:lstStyle/>
-          <a:p>
-            <a:pPr marL="0" lvl="0" indent="0" algn="l" rtl="0">
-              <a:spcBef>
-                <a:spcPts val="0"/>
-              </a:spcBef>
-              <a:spcAft>
-                <a:spcPts val="0"/>
-              </a:spcAft>
-              <a:buNone/>
-            </a:pPr>
-            <a:endParaRPr/>
-          </a:p>
-        </p:txBody>
-      </p:sp>
-    </p:spTree>
-  </p:cSld>
-  <p:clrMapOvr>
-    <a:masterClrMapping/>
-  </p:clrMapOvr>
-</p:notes>
-</file>
-
-<file path=ppt/notesSlides/notesSlide24.xml><?xml version="1.0" encoding="utf-8"?>
-<p:notes xmlns:a="http://schemas.openxmlformats.org/drawingml/2006/main" xmlns:r="http://schemas.openxmlformats.org/officeDocument/2006/relationships" xmlns:p="http://schemas.openxmlformats.org/presentationml/2006/main" showMasterSp="0" showMasterPhAnim="0">
-  <p:cSld>
-    <p:spTree>
-      <p:nvGrpSpPr>
-        <p:cNvPr id="1" name="Shape 416"/>
-        <p:cNvGrpSpPr/>
-        <p:nvPr/>
-      </p:nvGrpSpPr>
-      <p:grpSpPr>
-        <a:xfrm>
-          <a:off x="0" y="0"/>
-          <a:ext cx="0" cy="0"/>
-          <a:chOff x="0" y="0"/>
-          <a:chExt cx="0" cy="0"/>
-        </a:xfrm>
-      </p:grpSpPr>
-      <p:sp>
-        <p:nvSpPr>
-          <p:cNvPr id="417" name="Google Shape;417;g10043abaf29_0_286:notes"/>
-          <p:cNvSpPr>
-            <a:spLocks noGrp="1" noRot="1" noChangeAspect="1"/>
-          </p:cNvSpPr>
-          <p:nvPr>
-            <p:ph type="sldImg" idx="2"/>
-          </p:nvPr>
-        </p:nvSpPr>
-        <p:spPr>
-          <a:xfrm>
-            <a:off x="381000" y="685800"/>
-            <a:ext cx="6096000" cy="3429000"/>
-          </a:xfrm>
-          <a:custGeom>
-            <a:avLst/>
-            <a:gdLst/>
-            <a:ahLst/>
-            <a:cxnLst/>
-            <a:rect l="l" t="t" r="r" b="b"/>
-            <a:pathLst>
-              <a:path w="120000" h="120000" extrusionOk="0">
-                <a:moveTo>
-                  <a:pt x="0" y="0"/>
-                </a:moveTo>
-                <a:lnTo>
-                  <a:pt x="120000" y="0"/>
-                </a:lnTo>
-                <a:lnTo>
-                  <a:pt x="120000" y="120000"/>
-                </a:lnTo>
-                <a:lnTo>
-                  <a:pt x="0" y="120000"/>
-                </a:lnTo>
-                <a:close/>
-              </a:path>
-            </a:pathLst>
-          </a:custGeom>
-        </p:spPr>
-      </p:sp>
-      <p:sp>
-        <p:nvSpPr>
-          <p:cNvPr id="418" name="Google Shape;418;g10043abaf29_0_286:notes"/>
-          <p:cNvSpPr txBox="1">
-            <a:spLocks noGrp="1"/>
-          </p:cNvSpPr>
-          <p:nvPr>
-            <p:ph type="body" idx="1"/>
-          </p:nvPr>
-        </p:nvSpPr>
-        <p:spPr>
-          <a:xfrm>
-            <a:off x="685800" y="4343400"/>
-            <a:ext cx="5486400" cy="4114800"/>
-          </a:xfrm>
-          <a:prstGeom prst="rect">
-            <a:avLst/>
-          </a:prstGeom>
-        </p:spPr>
-        <p:txBody>
-          <a:bodyPr spcFirstLastPara="1" wrap="square" lIns="91425" tIns="91425" rIns="91425" bIns="91425" anchor="t" anchorCtr="0">
-            <a:noAutofit/>
-          </a:bodyPr>
-          <a:lstStyle/>
-          <a:p>
-            <a:pPr marL="0" lvl="0" indent="0" algn="l" rtl="0">
-              <a:spcBef>
-                <a:spcPts val="0"/>
-              </a:spcBef>
-              <a:spcAft>
-                <a:spcPts val="0"/>
-              </a:spcAft>
-              <a:buNone/>
-            </a:pPr>
-            <a:endParaRPr/>
-          </a:p>
-        </p:txBody>
-      </p:sp>
-    </p:spTree>
     <p:extLst>
       <p:ext uri="{BB962C8B-B14F-4D97-AF65-F5344CB8AC3E}">
         <p14:creationId xmlns:p14="http://schemas.microsoft.com/office/powerpoint/2010/main" val="993754063"/>
@@ -2512,7 +2197,7 @@
 </p:notes>
 </file>
 
-<file path=ppt/notesSlides/notesSlide25.xml><?xml version="1.0" encoding="utf-8"?>
+<file path=ppt/notesSlides/notesSlide22.xml><?xml version="1.0" encoding="utf-8"?>
 <p:notes xmlns:a="http://schemas.openxmlformats.org/drawingml/2006/main" xmlns:r="http://schemas.openxmlformats.org/officeDocument/2006/relationships" xmlns:p="http://schemas.openxmlformats.org/presentationml/2006/main" showMasterSp="0" showMasterPhAnim="0">
   <p:cSld>
     <p:spTree>
@@ -21128,342 +20813,6 @@
               <a:buNone/>
             </a:pPr>
             <a:r>
-              <a:rPr lang="en"/>
-              <a:t>Projects Matt and Ben Have Done</a:t>
-            </a:r>
-            <a:endParaRPr/>
-          </a:p>
-        </p:txBody>
-      </p:sp>
-      <p:sp>
-        <p:nvSpPr>
-          <p:cNvPr id="421" name="Google Shape;421;p33"/>
-          <p:cNvSpPr txBox="1">
-            <a:spLocks noGrp="1"/>
-          </p:cNvSpPr>
-          <p:nvPr>
-            <p:ph type="body" idx="1"/>
-          </p:nvPr>
-        </p:nvSpPr>
-        <p:spPr>
-          <a:xfrm>
-            <a:off x="1303800" y="1990050"/>
-            <a:ext cx="7030500" cy="2541600"/>
-          </a:xfrm>
-          <a:prstGeom prst="rect">
-            <a:avLst/>
-          </a:prstGeom>
-        </p:spPr>
-        <p:txBody>
-          <a:bodyPr spcFirstLastPara="1" wrap="square" lIns="91425" tIns="91425" rIns="91425" bIns="91425" anchor="t" anchorCtr="0">
-            <a:normAutofit fontScale="92500"/>
-          </a:bodyPr>
-          <a:lstStyle/>
-          <a:p>
-            <a:pPr marL="0" lvl="0" indent="0" algn="l" rtl="0">
-              <a:spcBef>
-                <a:spcPts val="0"/>
-              </a:spcBef>
-              <a:spcAft>
-                <a:spcPts val="0"/>
-              </a:spcAft>
-              <a:buNone/>
-            </a:pPr>
-            <a:r>
-              <a:rPr lang="en"/>
-              <a:t>One of the most exciting things we have done with the knowledge we have learned from Data Science is forming our own company and being able to work/learn all over the country.  While Ben and I met in a math course, we stayed in touch long after graduation.  Around the end of 2019 an old professor we used to work for got us in touch with a company looking for Data Scientists and thus we started our own company.  Ultimately, we wanted to give back with the knowledge we have acquired and we are so excited to teach this course!  We hope you can use what we’ve learned to help out in your career!</a:t>
-            </a:r>
-            <a:endParaRPr/>
-          </a:p>
-          <a:p>
-            <a:pPr marL="0" lvl="0" indent="0" algn="l" rtl="0">
-              <a:spcBef>
-                <a:spcPts val="1200"/>
-              </a:spcBef>
-              <a:spcAft>
-                <a:spcPts val="0"/>
-              </a:spcAft>
-              <a:buNone/>
-            </a:pPr>
-            <a:r>
-              <a:rPr lang="en" u="sng">
-                <a:solidFill>
-                  <a:schemeClr val="hlink"/>
-                </a:solidFill>
-                <a:hlinkClick r:id="rId3"/>
-              </a:rPr>
-              <a:t>https://github.com/NolanSmithSolutions/</a:t>
-            </a:r>
-            <a:endParaRPr/>
-          </a:p>
-          <a:p>
-            <a:pPr marL="0" lvl="0" indent="0" algn="l" rtl="0">
-              <a:spcBef>
-                <a:spcPts val="1200"/>
-              </a:spcBef>
-              <a:spcAft>
-                <a:spcPts val="1200"/>
-              </a:spcAft>
-              <a:buNone/>
-            </a:pPr>
-            <a:r>
-              <a:rPr lang="en"/>
-              <a:t>The link above not only contains our lectures - sometimes we put up non-proprietary projects or stuff we do for fun.</a:t>
-            </a:r>
-            <a:endParaRPr/>
-          </a:p>
-        </p:txBody>
-      </p:sp>
-    </p:spTree>
-  </p:cSld>
-  <p:clrMapOvr>
-    <a:masterClrMapping/>
-  </p:clrMapOvr>
-</p:sld>
-</file>
-
-<file path=ppt/slides/slide22.xml><?xml version="1.0" encoding="utf-8"?>
-<p:sld xmlns:a="http://schemas.openxmlformats.org/drawingml/2006/main" xmlns:r="http://schemas.openxmlformats.org/officeDocument/2006/relationships" xmlns:p="http://schemas.openxmlformats.org/presentationml/2006/main">
-  <p:cSld>
-    <p:spTree>
-      <p:nvGrpSpPr>
-        <p:cNvPr id="1" name="Shape 425"/>
-        <p:cNvGrpSpPr/>
-        <p:nvPr/>
-      </p:nvGrpSpPr>
-      <p:grpSpPr>
-        <a:xfrm>
-          <a:off x="0" y="0"/>
-          <a:ext cx="0" cy="0"/>
-          <a:chOff x="0" y="0"/>
-          <a:chExt cx="0" cy="0"/>
-        </a:xfrm>
-      </p:grpSpPr>
-      <p:sp>
-        <p:nvSpPr>
-          <p:cNvPr id="426" name="Google Shape;426;p34"/>
-          <p:cNvSpPr txBox="1">
-            <a:spLocks noGrp="1"/>
-          </p:cNvSpPr>
-          <p:nvPr>
-            <p:ph type="title"/>
-          </p:nvPr>
-        </p:nvSpPr>
-        <p:spPr>
-          <a:xfrm>
-            <a:off x="1303800" y="598575"/>
-            <a:ext cx="7030500" cy="999300"/>
-          </a:xfrm>
-          <a:prstGeom prst="rect">
-            <a:avLst/>
-          </a:prstGeom>
-        </p:spPr>
-        <p:txBody>
-          <a:bodyPr spcFirstLastPara="1" wrap="square" lIns="91425" tIns="91425" rIns="91425" bIns="91425" anchor="t" anchorCtr="0">
-            <a:normAutofit/>
-          </a:bodyPr>
-          <a:lstStyle/>
-          <a:p>
-            <a:pPr marL="0" lvl="0" indent="0" algn="l" rtl="0">
-              <a:spcBef>
-                <a:spcPts val="0"/>
-              </a:spcBef>
-              <a:spcAft>
-                <a:spcPts val="0"/>
-              </a:spcAft>
-              <a:buNone/>
-            </a:pPr>
-            <a:r>
-              <a:rPr lang="en"/>
-              <a:t>Predictive Financial Model</a:t>
-            </a:r>
-            <a:endParaRPr/>
-          </a:p>
-        </p:txBody>
-      </p:sp>
-      <p:pic>
-        <p:nvPicPr>
-          <p:cNvPr id="427" name="Google Shape;427;p34"/>
-          <p:cNvPicPr preferRelativeResize="0"/>
-          <p:nvPr/>
-        </p:nvPicPr>
-        <p:blipFill>
-          <a:blip r:embed="rId3">
-            <a:alphaModFix/>
-          </a:blip>
-          <a:stretch>
-            <a:fillRect/>
-          </a:stretch>
-        </p:blipFill>
-        <p:spPr>
-          <a:xfrm>
-            <a:off x="1201975" y="1359250"/>
-            <a:ext cx="7234325" cy="3536075"/>
-          </a:xfrm>
-          <a:prstGeom prst="rect">
-            <a:avLst/>
-          </a:prstGeom>
-          <a:noFill/>
-          <a:ln>
-            <a:noFill/>
-          </a:ln>
-        </p:spPr>
-      </p:pic>
-    </p:spTree>
-  </p:cSld>
-  <p:clrMapOvr>
-    <a:masterClrMapping/>
-  </p:clrMapOvr>
-</p:sld>
-</file>
-
-<file path=ppt/slides/slide23.xml><?xml version="1.0" encoding="utf-8"?>
-<p:sld xmlns:a="http://schemas.openxmlformats.org/drawingml/2006/main" xmlns:r="http://schemas.openxmlformats.org/officeDocument/2006/relationships" xmlns:p="http://schemas.openxmlformats.org/presentationml/2006/main">
-  <p:cSld>
-    <p:spTree>
-      <p:nvGrpSpPr>
-        <p:cNvPr id="1" name="Shape 431"/>
-        <p:cNvGrpSpPr/>
-        <p:nvPr/>
-      </p:nvGrpSpPr>
-      <p:grpSpPr>
-        <a:xfrm>
-          <a:off x="0" y="0"/>
-          <a:ext cx="0" cy="0"/>
-          <a:chOff x="0" y="0"/>
-          <a:chExt cx="0" cy="0"/>
-        </a:xfrm>
-      </p:grpSpPr>
-      <p:sp>
-        <p:nvSpPr>
-          <p:cNvPr id="432" name="Google Shape;432;p35"/>
-          <p:cNvSpPr txBox="1">
-            <a:spLocks noGrp="1"/>
-          </p:cNvSpPr>
-          <p:nvPr>
-            <p:ph type="title"/>
-          </p:nvPr>
-        </p:nvSpPr>
-        <p:spPr>
-          <a:xfrm>
-            <a:off x="1303800" y="598575"/>
-            <a:ext cx="7030500" cy="999300"/>
-          </a:xfrm>
-          <a:prstGeom prst="rect">
-            <a:avLst/>
-          </a:prstGeom>
-        </p:spPr>
-        <p:txBody>
-          <a:bodyPr spcFirstLastPara="1" wrap="square" lIns="91425" tIns="91425" rIns="91425" bIns="91425" anchor="t" anchorCtr="0">
-            <a:normAutofit/>
-          </a:bodyPr>
-          <a:lstStyle/>
-          <a:p>
-            <a:pPr marL="0" lvl="0" indent="0" algn="l" rtl="0">
-              <a:spcBef>
-                <a:spcPts val="0"/>
-              </a:spcBef>
-              <a:spcAft>
-                <a:spcPts val="0"/>
-              </a:spcAft>
-              <a:buNone/>
-            </a:pPr>
-            <a:r>
-              <a:rPr lang="en"/>
-              <a:t>Python Automation Tool w/ GUI</a:t>
-            </a:r>
-            <a:endParaRPr/>
-          </a:p>
-        </p:txBody>
-      </p:sp>
-      <p:pic>
-        <p:nvPicPr>
-          <p:cNvPr id="433" name="Google Shape;433;p35"/>
-          <p:cNvPicPr preferRelativeResize="0"/>
-          <p:nvPr/>
-        </p:nvPicPr>
-        <p:blipFill>
-          <a:blip r:embed="rId3">
-            <a:alphaModFix/>
-          </a:blip>
-          <a:stretch>
-            <a:fillRect/>
-          </a:stretch>
-        </p:blipFill>
-        <p:spPr>
-          <a:xfrm>
-            <a:off x="1194788" y="1325525"/>
-            <a:ext cx="7248525" cy="3581400"/>
-          </a:xfrm>
-          <a:prstGeom prst="rect">
-            <a:avLst/>
-          </a:prstGeom>
-          <a:noFill/>
-          <a:ln>
-            <a:noFill/>
-          </a:ln>
-        </p:spPr>
-      </p:pic>
-    </p:spTree>
-  </p:cSld>
-  <p:clrMapOvr>
-    <a:masterClrMapping/>
-  </p:clrMapOvr>
-</p:sld>
-</file>
-
-<file path=ppt/slides/slide24.xml><?xml version="1.0" encoding="utf-8"?>
-<p:sld xmlns:a="http://schemas.openxmlformats.org/drawingml/2006/main" xmlns:r="http://schemas.openxmlformats.org/officeDocument/2006/relationships" xmlns:p="http://schemas.openxmlformats.org/presentationml/2006/main">
-  <p:cSld>
-    <p:spTree>
-      <p:nvGrpSpPr>
-        <p:cNvPr id="1" name="Shape 419"/>
-        <p:cNvGrpSpPr/>
-        <p:nvPr/>
-      </p:nvGrpSpPr>
-      <p:grpSpPr>
-        <a:xfrm>
-          <a:off x="0" y="0"/>
-          <a:ext cx="0" cy="0"/>
-          <a:chOff x="0" y="0"/>
-          <a:chExt cx="0" cy="0"/>
-        </a:xfrm>
-      </p:grpSpPr>
-      <p:sp>
-        <p:nvSpPr>
-          <p:cNvPr id="420" name="Google Shape;420;p33"/>
-          <p:cNvSpPr txBox="1">
-            <a:spLocks noGrp="1"/>
-          </p:cNvSpPr>
-          <p:nvPr>
-            <p:ph type="title"/>
-          </p:nvPr>
-        </p:nvSpPr>
-        <p:spPr>
-          <a:xfrm>
-            <a:off x="1303800" y="598575"/>
-            <a:ext cx="7030500" cy="999300"/>
-          </a:xfrm>
-          <a:prstGeom prst="rect">
-            <a:avLst/>
-          </a:prstGeom>
-        </p:spPr>
-        <p:txBody>
-          <a:bodyPr spcFirstLastPara="1" wrap="square" lIns="91425" tIns="91425" rIns="91425" bIns="91425" anchor="t" anchorCtr="0">
-            <a:normAutofit/>
-          </a:bodyPr>
-          <a:lstStyle/>
-          <a:p>
-            <a:pPr marL="0" lvl="0" indent="0" algn="l" rtl="0">
-              <a:spcBef>
-                <a:spcPts val="0"/>
-              </a:spcBef>
-              <a:spcAft>
-                <a:spcPts val="0"/>
-              </a:spcAft>
-              <a:buNone/>
-            </a:pPr>
-            <a:r>
               <a:rPr lang="en" dirty="0"/>
               <a:t>Data Science in Finance &amp; Business</a:t>
             </a:r>
@@ -21539,7 +20888,7 @@
 </p:sld>
 </file>
 
-<file path=ppt/slides/slide25.xml><?xml version="1.0" encoding="utf-8"?>
+<file path=ppt/slides/slide22.xml><?xml version="1.0" encoding="utf-8"?>
 <p:sld xmlns:a="http://schemas.openxmlformats.org/drawingml/2006/main" xmlns:r="http://schemas.openxmlformats.org/officeDocument/2006/relationships" xmlns:p="http://schemas.openxmlformats.org/presentationml/2006/main">
   <p:cSld>
     <p:spTree>
@@ -22291,7 +21640,7 @@
         </p:spPr>
         <p:txBody>
           <a:bodyPr spcFirstLastPara="1" wrap="square" lIns="91425" tIns="91425" rIns="91425" bIns="91425" anchor="t" anchorCtr="0">
-            <a:normAutofit fontScale="92500" lnSpcReduction="20000"/>
+            <a:normAutofit/>
           </a:bodyPr>
           <a:lstStyle/>
           <a:p>
@@ -22306,10 +21655,10 @@
               <a:buChar char="●"/>
             </a:pPr>
             <a:r>
-              <a:rPr lang="en"/>
+              <a:rPr lang="en" dirty="0"/>
               <a:t>1st - Introductory Computer Programming (A)</a:t>
             </a:r>
-            <a:endParaRPr/>
+            <a:endParaRPr dirty="0"/>
           </a:p>
           <a:p>
             <a:pPr marL="914400" lvl="1" indent="-298450" algn="l" rtl="0">
@@ -22323,10 +21672,10 @@
               <a:buChar char="○"/>
             </a:pPr>
             <a:r>
-              <a:rPr lang="en"/>
+              <a:rPr lang="en" dirty="0"/>
               <a:t>Often in Python</a:t>
             </a:r>
-            <a:endParaRPr/>
+            <a:endParaRPr dirty="0"/>
           </a:p>
           <a:p>
             <a:pPr marL="914400" lvl="1" indent="-298450" algn="l" rtl="0">
@@ -22340,19 +21689,10 @@
               <a:buChar char="○"/>
             </a:pPr>
             <a:r>
-              <a:rPr lang="en"/>
-              <a:t>Duke: </a:t>
+              <a:rPr lang="en" dirty="0"/>
+              <a:t>How to write and debug code</a:t>
             </a:r>
-            <a:r>
-              <a:rPr lang="en" u="sng">
-                <a:solidFill>
-                  <a:schemeClr val="hlink"/>
-                </a:solidFill>
-                <a:hlinkClick r:id="rId3"/>
-              </a:rPr>
-              <a:t>Compsci101</a:t>
-            </a:r>
-            <a:endParaRPr/>
+            <a:endParaRPr dirty="0"/>
           </a:p>
           <a:p>
             <a:pPr marL="914400" lvl="1" indent="-298450" algn="l" rtl="0">
@@ -22366,10 +21706,31 @@
               <a:buChar char="○"/>
             </a:pPr>
             <a:r>
-              <a:rPr lang="en"/>
-              <a:t>How to write and debug code</a:t>
+              <a:rPr lang="en" dirty="0"/>
+              <a:t>How to manage program complexity and learn basic programming </a:t>
             </a:r>
-            <a:endParaRPr/>
+            <a:r>
+              <a:rPr lang="en" dirty="0" err="1"/>
+              <a:t>knowldge</a:t>
+            </a:r>
+            <a:endParaRPr dirty="0"/>
+          </a:p>
+          <a:p>
+            <a:pPr marL="457200" lvl="0" indent="-311150" algn="l" rtl="0">
+              <a:spcBef>
+                <a:spcPts val="0"/>
+              </a:spcBef>
+              <a:spcAft>
+                <a:spcPts val="0"/>
+              </a:spcAft>
+              <a:buSzPts val="1300"/>
+              <a:buChar char="●"/>
+            </a:pPr>
+            <a:r>
+              <a:rPr lang="en" dirty="0"/>
+              <a:t>2nd - Data Structures and Algorithms (A-)</a:t>
+            </a:r>
+            <a:endParaRPr dirty="0"/>
           </a:p>
           <a:p>
             <a:pPr marL="914400" lvl="1" indent="-298450" algn="l" rtl="0">
@@ -22383,10 +21744,44 @@
               <a:buChar char="○"/>
             </a:pPr>
             <a:r>
-              <a:rPr lang="en"/>
-              <a:t>How to manage program complexity and learn basic programming knowldge</a:t>
+              <a:rPr lang="en" dirty="0"/>
+              <a:t>Often in Java</a:t>
             </a:r>
-            <a:endParaRPr/>
+            <a:endParaRPr dirty="0"/>
+          </a:p>
+          <a:p>
+            <a:pPr marL="914400" lvl="1" indent="-298450" algn="l" rtl="0">
+              <a:spcBef>
+                <a:spcPts val="0"/>
+              </a:spcBef>
+              <a:spcAft>
+                <a:spcPts val="0"/>
+              </a:spcAft>
+              <a:buSzPts val="1100"/>
+              <a:buChar char="○"/>
+            </a:pPr>
+            <a:r>
+              <a:rPr lang="en" dirty="0"/>
+              <a:t>Deals with tradeoffs in time and memory with structuring data/programs</a:t>
+            </a:r>
+            <a:endParaRPr dirty="0"/>
+          </a:p>
+          <a:p>
+            <a:pPr marL="914400" lvl="1" indent="-298450" algn="l" rtl="0">
+              <a:spcBef>
+                <a:spcPts val="0"/>
+              </a:spcBef>
+              <a:spcAft>
+                <a:spcPts val="0"/>
+              </a:spcAft>
+              <a:buSzPts val="1100"/>
+              <a:buChar char="○"/>
+            </a:pPr>
+            <a:r>
+              <a:rPr lang="en" dirty="0"/>
+              <a:t>How to construct and analyze larger programs</a:t>
+            </a:r>
+            <a:endParaRPr dirty="0"/>
           </a:p>
           <a:p>
             <a:pPr marL="457200" lvl="0" indent="-311150" algn="l" rtl="0">
@@ -22400,10 +21795,10 @@
               <a:buChar char="●"/>
             </a:pPr>
             <a:r>
-              <a:rPr lang="en"/>
-              <a:t>2nd - Data Structures and Algorithms (A-)</a:t>
+              <a:rPr lang="en" dirty="0"/>
+              <a:t>? - Computer Architecture (C+)</a:t>
             </a:r>
-            <a:endParaRPr/>
+            <a:endParaRPr dirty="0"/>
           </a:p>
           <a:p>
             <a:pPr marL="914400" lvl="1" indent="-298450" algn="l" rtl="0">
@@ -22417,10 +21812,10 @@
               <a:buChar char="○"/>
             </a:pPr>
             <a:r>
-              <a:rPr lang="en"/>
-              <a:t>Often in Java</a:t>
+              <a:rPr lang="en" dirty="0"/>
+              <a:t>Often in C++</a:t>
             </a:r>
-            <a:endParaRPr/>
+            <a:endParaRPr dirty="0"/>
           </a:p>
           <a:p>
             <a:pPr marL="914400" lvl="1" indent="-298450" algn="l" rtl="0">
@@ -22434,19 +21829,27 @@
               <a:buChar char="○"/>
             </a:pPr>
             <a:r>
-              <a:rPr lang="en"/>
-              <a:t>Duke: </a:t>
+              <a:rPr lang="en" dirty="0"/>
+              <a:t>How machines execute programs and deal with memory</a:t>
             </a:r>
+            <a:endParaRPr dirty="0"/>
+          </a:p>
+          <a:p>
+            <a:pPr marL="457200" lvl="0" indent="-311150" algn="l" rtl="0">
+              <a:spcBef>
+                <a:spcPts val="0"/>
+              </a:spcBef>
+              <a:spcAft>
+                <a:spcPts val="0"/>
+              </a:spcAft>
+              <a:buSzPts val="1300"/>
+              <a:buChar char="●"/>
+            </a:pPr>
             <a:r>
-              <a:rPr lang="en" u="sng">
-                <a:solidFill>
-                  <a:schemeClr val="hlink"/>
-                </a:solidFill>
-                <a:hlinkClick r:id="rId4"/>
-              </a:rPr>
-              <a:t>Compsci201</a:t>
+              <a:rPr lang="en" dirty="0"/>
+              <a:t>? - Discrete Mathematics (B-)</a:t>
             </a:r>
-            <a:endParaRPr/>
+            <a:endParaRPr dirty="0"/>
           </a:p>
           <a:p>
             <a:pPr marL="914400" lvl="1" indent="-298450" algn="l" rtl="0">
@@ -22460,146 +21863,10 @@
               <a:buChar char="○"/>
             </a:pPr>
             <a:r>
-              <a:rPr lang="en"/>
-              <a:t>Deals with tradeoffs in time and memory with structuring data/programs</a:t>
-            </a:r>
-            <a:endParaRPr/>
-          </a:p>
-          <a:p>
-            <a:pPr marL="914400" lvl="1" indent="-298450" algn="l" rtl="0">
-              <a:spcBef>
-                <a:spcPts val="0"/>
-              </a:spcBef>
-              <a:spcAft>
-                <a:spcPts val="0"/>
-              </a:spcAft>
-              <a:buSzPts val="1100"/>
-              <a:buChar char="○"/>
-            </a:pPr>
-            <a:r>
-              <a:rPr lang="en"/>
-              <a:t>How to construct and analyze larger programs</a:t>
-            </a:r>
-            <a:endParaRPr/>
-          </a:p>
-          <a:p>
-            <a:pPr marL="457200" lvl="0" indent="-311150" algn="l" rtl="0">
-              <a:spcBef>
-                <a:spcPts val="0"/>
-              </a:spcBef>
-              <a:spcAft>
-                <a:spcPts val="0"/>
-              </a:spcAft>
-              <a:buSzPts val="1300"/>
-              <a:buChar char="●"/>
-            </a:pPr>
-            <a:r>
-              <a:rPr lang="en"/>
-              <a:t>? - Computer Architecture (C+)</a:t>
-            </a:r>
-            <a:endParaRPr/>
-          </a:p>
-          <a:p>
-            <a:pPr marL="914400" lvl="1" indent="-298450" algn="l" rtl="0">
-              <a:spcBef>
-                <a:spcPts val="0"/>
-              </a:spcBef>
-              <a:spcAft>
-                <a:spcPts val="0"/>
-              </a:spcAft>
-              <a:buSzPts val="1100"/>
-              <a:buChar char="○"/>
-            </a:pPr>
-            <a:r>
-              <a:rPr lang="en"/>
-              <a:t>Often in C++</a:t>
-            </a:r>
-            <a:endParaRPr/>
-          </a:p>
-          <a:p>
-            <a:pPr marL="914400" lvl="1" indent="-298450" algn="l" rtl="0">
-              <a:spcBef>
-                <a:spcPts val="0"/>
-              </a:spcBef>
-              <a:spcAft>
-                <a:spcPts val="0"/>
-              </a:spcAft>
-              <a:buSzPts val="1100"/>
-              <a:buChar char="○"/>
-            </a:pPr>
-            <a:r>
-              <a:rPr lang="en"/>
-              <a:t>How machines execute programs and deal with memory</a:t>
-            </a:r>
-            <a:endParaRPr/>
-          </a:p>
-          <a:p>
-            <a:pPr marL="457200" lvl="0" indent="-311150" algn="l" rtl="0">
-              <a:spcBef>
-                <a:spcPts val="0"/>
-              </a:spcBef>
-              <a:spcAft>
-                <a:spcPts val="0"/>
-              </a:spcAft>
-              <a:buSzPts val="1300"/>
-              <a:buChar char="●"/>
-            </a:pPr>
-            <a:r>
-              <a:rPr lang="en"/>
-              <a:t>? - Discrete Mathematics (B-)</a:t>
-            </a:r>
-            <a:endParaRPr/>
-          </a:p>
-          <a:p>
-            <a:pPr marL="914400" lvl="1" indent="-298450" algn="l" rtl="0">
-              <a:spcBef>
-                <a:spcPts val="0"/>
-              </a:spcBef>
-              <a:spcAft>
-                <a:spcPts val="0"/>
-              </a:spcAft>
-              <a:buSzPts val="1100"/>
-              <a:buChar char="○"/>
-            </a:pPr>
-            <a:r>
-              <a:rPr lang="en"/>
+              <a:rPr lang="en" dirty="0"/>
               <a:t>Often introduces proofs and introduces math used in higher level CS courses without taking a semester deep dive into such topics in their actual courses</a:t>
             </a:r>
-            <a:endParaRPr/>
-          </a:p>
-          <a:p>
-            <a:pPr marL="0" lvl="0" indent="0" algn="l" rtl="0">
-              <a:spcBef>
-                <a:spcPts val="1200"/>
-              </a:spcBef>
-              <a:spcAft>
-                <a:spcPts val="1200"/>
-              </a:spcAft>
-              <a:buNone/>
-            </a:pPr>
-            <a:r>
-              <a:rPr lang="en"/>
-              <a:t>Further reading: </a:t>
-            </a:r>
-            <a:r>
-              <a:rPr lang="en" u="sng">
-                <a:solidFill>
-                  <a:schemeClr val="hlink"/>
-                </a:solidFill>
-                <a:hlinkClick r:id="rId5"/>
-              </a:rPr>
-              <a:t>https://www.cs.duke.edu/undergrad/starti</a:t>
-            </a:r>
-            <a:r>
-              <a:rPr lang="en" u="sng">
-                <a:solidFill>
-                  <a:schemeClr val="hlink"/>
-                </a:solidFill>
-                <a:hlinkClick r:id="rId5"/>
-              </a:rPr>
-              <a:t>ng</a:t>
-            </a:r>
-            <a:endParaRPr/>
+            <a:endParaRPr dirty="0"/>
           </a:p>
         </p:txBody>
       </p:sp>

</xml_diff>